<commit_message>
Add RefoliationMinimumTrigger, RefoliationMaximum, RefoliationCost, NonRefoliationCost parameters. Update Defaults/PnETGenericDefaultParameters.txt Compile with updated cohort library.
</commit_message>
<xml_diff>
--- a/docs/wieghted_avg.pptx
+++ b/docs/wieghted_avg.pptx
@@ -107,6 +107,11 @@
       </a:defRPr>
     </a:lvl9pPr>
   </p:defaultTextStyle>
+  <p:extLst>
+    <p:ext uri="{EFAFB233-063F-42B5-8137-9DF3F51BA10A}">
+      <p15:sldGuideLst xmlns:p15="http://schemas.microsoft.com/office/powerpoint/2012/main"/>
+    </p:ext>
+  </p:extLst>
 </p:presentation>
 </file>
 
@@ -257,7 +262,7 @@
           <a:p>
             <a:fld id="{0526F0A8-B7D1-42EF-BA6E-2DFC0C3A001D}" type="datetimeFigureOut">
               <a:rPr lang="en-US" smtClean="0"/>
-              <a:t>10/8/2021</a:t>
+              <a:t>12/1/2021</a:t>
             </a:fld>
             <a:endParaRPr lang="en-US"/>
           </a:p>
@@ -455,7 +460,7 @@
           <a:p>
             <a:fld id="{0526F0A8-B7D1-42EF-BA6E-2DFC0C3A001D}" type="datetimeFigureOut">
               <a:rPr lang="en-US" smtClean="0"/>
-              <a:t>10/8/2021</a:t>
+              <a:t>12/1/2021</a:t>
             </a:fld>
             <a:endParaRPr lang="en-US"/>
           </a:p>
@@ -663,7 +668,7 @@
           <a:p>
             <a:fld id="{0526F0A8-B7D1-42EF-BA6E-2DFC0C3A001D}" type="datetimeFigureOut">
               <a:rPr lang="en-US" smtClean="0"/>
-              <a:t>10/8/2021</a:t>
+              <a:t>12/1/2021</a:t>
             </a:fld>
             <a:endParaRPr lang="en-US"/>
           </a:p>
@@ -861,7 +866,7 @@
           <a:p>
             <a:fld id="{0526F0A8-B7D1-42EF-BA6E-2DFC0C3A001D}" type="datetimeFigureOut">
               <a:rPr lang="en-US" smtClean="0"/>
-              <a:t>10/8/2021</a:t>
+              <a:t>12/1/2021</a:t>
             </a:fld>
             <a:endParaRPr lang="en-US"/>
           </a:p>
@@ -1136,7 +1141,7 @@
           <a:p>
             <a:fld id="{0526F0A8-B7D1-42EF-BA6E-2DFC0C3A001D}" type="datetimeFigureOut">
               <a:rPr lang="en-US" smtClean="0"/>
-              <a:t>10/8/2021</a:t>
+              <a:t>12/1/2021</a:t>
             </a:fld>
             <a:endParaRPr lang="en-US"/>
           </a:p>
@@ -1401,7 +1406,7 @@
           <a:p>
             <a:fld id="{0526F0A8-B7D1-42EF-BA6E-2DFC0C3A001D}" type="datetimeFigureOut">
               <a:rPr lang="en-US" smtClean="0"/>
-              <a:t>10/8/2021</a:t>
+              <a:t>12/1/2021</a:t>
             </a:fld>
             <a:endParaRPr lang="en-US"/>
           </a:p>
@@ -1813,7 +1818,7 @@
           <a:p>
             <a:fld id="{0526F0A8-B7D1-42EF-BA6E-2DFC0C3A001D}" type="datetimeFigureOut">
               <a:rPr lang="en-US" smtClean="0"/>
-              <a:t>10/8/2021</a:t>
+              <a:t>12/1/2021</a:t>
             </a:fld>
             <a:endParaRPr lang="en-US"/>
           </a:p>
@@ -1954,7 +1959,7 @@
           <a:p>
             <a:fld id="{0526F0A8-B7D1-42EF-BA6E-2DFC0C3A001D}" type="datetimeFigureOut">
               <a:rPr lang="en-US" smtClean="0"/>
-              <a:t>10/8/2021</a:t>
+              <a:t>12/1/2021</a:t>
             </a:fld>
             <a:endParaRPr lang="en-US"/>
           </a:p>
@@ -2067,7 +2072,7 @@
           <a:p>
             <a:fld id="{0526F0A8-B7D1-42EF-BA6E-2DFC0C3A001D}" type="datetimeFigureOut">
               <a:rPr lang="en-US" smtClean="0"/>
-              <a:t>10/8/2021</a:t>
+              <a:t>12/1/2021</a:t>
             </a:fld>
             <a:endParaRPr lang="en-US"/>
           </a:p>
@@ -2378,7 +2383,7 @@
           <a:p>
             <a:fld id="{0526F0A8-B7D1-42EF-BA6E-2DFC0C3A001D}" type="datetimeFigureOut">
               <a:rPr lang="en-US" smtClean="0"/>
-              <a:t>10/8/2021</a:t>
+              <a:t>12/1/2021</a:t>
             </a:fld>
             <a:endParaRPr lang="en-US"/>
           </a:p>
@@ -2666,7 +2671,7 @@
           <a:p>
             <a:fld id="{0526F0A8-B7D1-42EF-BA6E-2DFC0C3A001D}" type="datetimeFigureOut">
               <a:rPr lang="en-US" smtClean="0"/>
-              <a:t>10/8/2021</a:t>
+              <a:t>12/1/2021</a:t>
             </a:fld>
             <a:endParaRPr lang="en-US"/>
           </a:p>
@@ -2907,7 +2912,7 @@
           <a:p>
             <a:fld id="{0526F0A8-B7D1-42EF-BA6E-2DFC0C3A001D}" type="datetimeFigureOut">
               <a:rPr lang="en-US" smtClean="0"/>
-              <a:t>10/8/2021</a:t>
+              <a:t>12/1/2021</a:t>
             </a:fld>
             <a:endParaRPr lang="en-US"/>
           </a:p>
@@ -16544,7 +16549,7 @@
                   <a:schemeClr val="accent1"/>
                 </a:solidFill>
               </a:rPr>
-              <a:t>40,000 kg</a:t>
+              <a:t>33,333 kg</a:t>
             </a:r>
           </a:p>
         </p:txBody>
@@ -16583,7 +16588,7 @@
                   <a:schemeClr val="accent2"/>
                 </a:solidFill>
               </a:rPr>
-              <a:t>10,000 kg</a:t>
+              <a:t>16,667 kg</a:t>
             </a:r>
           </a:p>
         </p:txBody>
@@ -16657,7 +16662,7 @@
                   <a:schemeClr val="accent1"/>
                 </a:solidFill>
               </a:rPr>
-              <a:t>= 6666 kg / tree</a:t>
+              <a:t>= 5556 kg / tree</a:t>
             </a:r>
           </a:p>
         </p:txBody>
@@ -16696,7 +16701,7 @@
                   <a:schemeClr val="accent2"/>
                 </a:solidFill>
               </a:rPr>
-              <a:t>= 3333 kg / tree</a:t>
+              <a:t>= 5556 kg / tree</a:t>
             </a:r>
           </a:p>
         </p:txBody>

</xml_diff>